<commit_message>
Adding tokenSecret to JWT pictures
</commit_message>
<xml_diff>
--- a/WhatToDoInFrontBackAndDB_usability_performance_security/naturalpeople_webuserlogins_approles_dbusers_dbroles_owndbitems.pptx
+++ b/WhatToDoInFrontBackAndDB_usability_performance_security/naturalpeople_webuserlogins_approles_dbusers_dbroles_owndbitems.pptx
@@ -265,7 +265,7 @@
           <a:p>
             <a:fld id="{AB466767-0EC2-4146-A188-74EE8EB24694}" type="datetimeFigureOut">
               <a:rPr lang="fi-FI" smtClean="0"/>
-              <a:t>27.2.2024</a:t>
+              <a:t>7.11.2024</a:t>
             </a:fld>
             <a:endParaRPr lang="fi-FI"/>
           </a:p>
@@ -465,7 +465,7 @@
           <a:p>
             <a:fld id="{AB466767-0EC2-4146-A188-74EE8EB24694}" type="datetimeFigureOut">
               <a:rPr lang="fi-FI" smtClean="0"/>
-              <a:t>27.2.2024</a:t>
+              <a:t>7.11.2024</a:t>
             </a:fld>
             <a:endParaRPr lang="fi-FI"/>
           </a:p>
@@ -675,7 +675,7 @@
           <a:p>
             <a:fld id="{AB466767-0EC2-4146-A188-74EE8EB24694}" type="datetimeFigureOut">
               <a:rPr lang="fi-FI" smtClean="0"/>
-              <a:t>27.2.2024</a:t>
+              <a:t>7.11.2024</a:t>
             </a:fld>
             <a:endParaRPr lang="fi-FI"/>
           </a:p>
@@ -875,7 +875,7 @@
           <a:p>
             <a:fld id="{AB466767-0EC2-4146-A188-74EE8EB24694}" type="datetimeFigureOut">
               <a:rPr lang="fi-FI" smtClean="0"/>
-              <a:t>27.2.2024</a:t>
+              <a:t>7.11.2024</a:t>
             </a:fld>
             <a:endParaRPr lang="fi-FI"/>
           </a:p>
@@ -1151,7 +1151,7 @@
           <a:p>
             <a:fld id="{AB466767-0EC2-4146-A188-74EE8EB24694}" type="datetimeFigureOut">
               <a:rPr lang="fi-FI" smtClean="0"/>
-              <a:t>27.2.2024</a:t>
+              <a:t>7.11.2024</a:t>
             </a:fld>
             <a:endParaRPr lang="fi-FI"/>
           </a:p>
@@ -1419,7 +1419,7 @@
           <a:p>
             <a:fld id="{AB466767-0EC2-4146-A188-74EE8EB24694}" type="datetimeFigureOut">
               <a:rPr lang="fi-FI" smtClean="0"/>
-              <a:t>27.2.2024</a:t>
+              <a:t>7.11.2024</a:t>
             </a:fld>
             <a:endParaRPr lang="fi-FI"/>
           </a:p>
@@ -1834,7 +1834,7 @@
           <a:p>
             <a:fld id="{AB466767-0EC2-4146-A188-74EE8EB24694}" type="datetimeFigureOut">
               <a:rPr lang="fi-FI" smtClean="0"/>
-              <a:t>27.2.2024</a:t>
+              <a:t>7.11.2024</a:t>
             </a:fld>
             <a:endParaRPr lang="fi-FI"/>
           </a:p>
@@ -1976,7 +1976,7 @@
           <a:p>
             <a:fld id="{AB466767-0EC2-4146-A188-74EE8EB24694}" type="datetimeFigureOut">
               <a:rPr lang="fi-FI" smtClean="0"/>
-              <a:t>27.2.2024</a:t>
+              <a:t>7.11.2024</a:t>
             </a:fld>
             <a:endParaRPr lang="fi-FI"/>
           </a:p>
@@ -2089,7 +2089,7 @@
           <a:p>
             <a:fld id="{AB466767-0EC2-4146-A188-74EE8EB24694}" type="datetimeFigureOut">
               <a:rPr lang="fi-FI" smtClean="0"/>
-              <a:t>27.2.2024</a:t>
+              <a:t>7.11.2024</a:t>
             </a:fld>
             <a:endParaRPr lang="fi-FI"/>
           </a:p>
@@ -2402,7 +2402,7 @@
           <a:p>
             <a:fld id="{AB466767-0EC2-4146-A188-74EE8EB24694}" type="datetimeFigureOut">
               <a:rPr lang="fi-FI" smtClean="0"/>
-              <a:t>27.2.2024</a:t>
+              <a:t>7.11.2024</a:t>
             </a:fld>
             <a:endParaRPr lang="fi-FI"/>
           </a:p>
@@ -2691,7 +2691,7 @@
           <a:p>
             <a:fld id="{AB466767-0EC2-4146-A188-74EE8EB24694}" type="datetimeFigureOut">
               <a:rPr lang="fi-FI" smtClean="0"/>
-              <a:t>27.2.2024</a:t>
+              <a:t>7.11.2024</a:t>
             </a:fld>
             <a:endParaRPr lang="fi-FI"/>
           </a:p>
@@ -2934,7 +2934,7 @@
           <a:p>
             <a:fld id="{AB466767-0EC2-4146-A188-74EE8EB24694}" type="datetimeFigureOut">
               <a:rPr lang="fi-FI" smtClean="0"/>
-              <a:t>27.2.2024</a:t>
+              <a:t>7.11.2024</a:t>
             </a:fld>
             <a:endParaRPr lang="fi-FI"/>
           </a:p>
@@ -14864,6 +14864,223 @@
           </a:p>
         </p:txBody>
       </p:sp>
+      <p:sp>
+        <p:nvSpPr>
+          <p:cNvPr id="3" name="TextBox 2">
+            <a:extLst>
+              <a:ext uri="{FF2B5EF4-FFF2-40B4-BE49-F238E27FC236}">
+                <a16:creationId xmlns:a16="http://schemas.microsoft.com/office/drawing/2014/main" id="{0190CAD0-FDB5-182D-4B1E-473278BA92C1}"/>
+              </a:ext>
+            </a:extLst>
+          </p:cNvPr>
+          <p:cNvSpPr txBox="1"/>
+          <p:nvPr/>
+        </p:nvSpPr>
+        <p:spPr>
+          <a:xfrm>
+            <a:off x="5754123" y="4684065"/>
+            <a:ext cx="889397" cy="246221"/>
+          </a:xfrm>
+          <a:prstGeom prst="rect">
+            <a:avLst/>
+          </a:prstGeom>
+          <a:noFill/>
+        </p:spPr>
+        <p:txBody>
+          <a:bodyPr wrap="square">
+            <a:spAutoFit/>
+          </a:bodyPr>
+          <a:lstStyle/>
+          <a:p>
+            <a:r>
+              <a:rPr lang="fi-FI" sz="1000" dirty="0" err="1">
+                <a:solidFill>
+                  <a:schemeClr val="accent1">
+                    <a:lumMod val="75000"/>
+                  </a:schemeClr>
+                </a:solidFill>
+              </a:rPr>
+              <a:t>tokenSecret</a:t>
+            </a:r>
+            <a:endParaRPr lang="fi-FI" sz="1000" dirty="0"/>
+          </a:p>
+        </p:txBody>
+      </p:sp>
+      <p:sp>
+        <p:nvSpPr>
+          <p:cNvPr id="4" name="TextBox 3">
+            <a:extLst>
+              <a:ext uri="{FF2B5EF4-FFF2-40B4-BE49-F238E27FC236}">
+                <a16:creationId xmlns:a16="http://schemas.microsoft.com/office/drawing/2014/main" id="{FA697320-34D8-D7B8-40A4-F1EB619CC3B8}"/>
+              </a:ext>
+            </a:extLst>
+          </p:cNvPr>
+          <p:cNvSpPr txBox="1"/>
+          <p:nvPr/>
+        </p:nvSpPr>
+        <p:spPr>
+          <a:xfrm>
+            <a:off x="6127244" y="4438528"/>
+            <a:ext cx="960095" cy="246221"/>
+          </a:xfrm>
+          <a:prstGeom prst="rect">
+            <a:avLst/>
+          </a:prstGeom>
+          <a:noFill/>
+        </p:spPr>
+        <p:txBody>
+          <a:bodyPr wrap="square">
+            <a:spAutoFit/>
+          </a:bodyPr>
+          <a:lstStyle/>
+          <a:p>
+            <a:r>
+              <a:rPr lang="fi-FI" sz="1000" dirty="0"/>
+              <a:t>-&gt; 2. </a:t>
+            </a:r>
+            <a:r>
+              <a:rPr lang="fi-FI" sz="1000" dirty="0" err="1"/>
+              <a:t>verify</a:t>
+            </a:r>
+            <a:endParaRPr lang="fi-FI" sz="1000" dirty="0"/>
+          </a:p>
+        </p:txBody>
+      </p:sp>
+      <p:sp>
+        <p:nvSpPr>
+          <p:cNvPr id="6" name="TextBox 5">
+            <a:extLst>
+              <a:ext uri="{FF2B5EF4-FFF2-40B4-BE49-F238E27FC236}">
+                <a16:creationId xmlns:a16="http://schemas.microsoft.com/office/drawing/2014/main" id="{EE70581C-59F0-3550-18A0-9CB27B974729}"/>
+              </a:ext>
+            </a:extLst>
+          </p:cNvPr>
+          <p:cNvSpPr txBox="1"/>
+          <p:nvPr/>
+        </p:nvSpPr>
+        <p:spPr>
+          <a:xfrm>
+            <a:off x="5480290" y="4438527"/>
+            <a:ext cx="889397" cy="246221"/>
+          </a:xfrm>
+          <a:prstGeom prst="rect">
+            <a:avLst/>
+          </a:prstGeom>
+          <a:noFill/>
+        </p:spPr>
+        <p:txBody>
+          <a:bodyPr wrap="square">
+            <a:spAutoFit/>
+          </a:bodyPr>
+          <a:lstStyle/>
+          <a:p>
+            <a:r>
+              <a:rPr lang="fi-FI" sz="1000" dirty="0"/>
+              <a:t>&lt;- 1. </a:t>
+            </a:r>
+            <a:r>
+              <a:rPr lang="fi-FI" sz="1000" dirty="0" err="1"/>
+              <a:t>sign</a:t>
+            </a:r>
+            <a:r>
+              <a:rPr lang="fi-FI" sz="1000" dirty="0"/>
+              <a:t>, </a:t>
+            </a:r>
+          </a:p>
+        </p:txBody>
+      </p:sp>
+      <p:cxnSp>
+        <p:nvCxnSpPr>
+          <p:cNvPr id="8" name="Straight Arrow Connector 7">
+            <a:extLst>
+              <a:ext uri="{FF2B5EF4-FFF2-40B4-BE49-F238E27FC236}">
+                <a16:creationId xmlns:a16="http://schemas.microsoft.com/office/drawing/2014/main" id="{8763190F-EDD5-329C-E1E9-7CA73B733646}"/>
+              </a:ext>
+            </a:extLst>
+          </p:cNvPr>
+          <p:cNvCxnSpPr>
+            <a:cxnSpLocks/>
+          </p:cNvCxnSpPr>
+          <p:nvPr/>
+        </p:nvCxnSpPr>
+        <p:spPr>
+          <a:xfrm flipH="1">
+            <a:off x="6321478" y="4643532"/>
+            <a:ext cx="123731" cy="97164"/>
+          </a:xfrm>
+          <a:prstGeom prst="straightConnector1">
+            <a:avLst/>
+          </a:prstGeom>
+          <a:ln>
+            <a:solidFill>
+              <a:schemeClr val="accent1"/>
+            </a:solidFill>
+            <a:prstDash val="sysDash"/>
+            <a:headEnd type="none"/>
+            <a:tailEnd type="none"/>
+          </a:ln>
+        </p:spPr>
+        <p:style>
+          <a:lnRef idx="1">
+            <a:schemeClr val="accent1"/>
+          </a:lnRef>
+          <a:fillRef idx="0">
+            <a:schemeClr val="accent1"/>
+          </a:fillRef>
+          <a:effectRef idx="0">
+            <a:schemeClr val="accent1"/>
+          </a:effectRef>
+          <a:fontRef idx="minor">
+            <a:schemeClr val="tx1"/>
+          </a:fontRef>
+        </p:style>
+      </p:cxnSp>
+      <p:cxnSp>
+        <p:nvCxnSpPr>
+          <p:cNvPr id="10" name="Straight Arrow Connector 9">
+            <a:extLst>
+              <a:ext uri="{FF2B5EF4-FFF2-40B4-BE49-F238E27FC236}">
+                <a16:creationId xmlns:a16="http://schemas.microsoft.com/office/drawing/2014/main" id="{E1AAB232-FC8D-767E-92CF-CA502853AA7A}"/>
+              </a:ext>
+            </a:extLst>
+          </p:cNvPr>
+          <p:cNvCxnSpPr>
+            <a:cxnSpLocks/>
+          </p:cNvCxnSpPr>
+          <p:nvPr/>
+        </p:nvCxnSpPr>
+        <p:spPr>
+          <a:xfrm>
+            <a:off x="5795617" y="4642528"/>
+            <a:ext cx="157203" cy="65834"/>
+          </a:xfrm>
+          <a:prstGeom prst="straightConnector1">
+            <a:avLst/>
+          </a:prstGeom>
+          <a:ln>
+            <a:solidFill>
+              <a:schemeClr val="accent1"/>
+            </a:solidFill>
+            <a:prstDash val="sysDash"/>
+            <a:headEnd type="none"/>
+            <a:tailEnd type="none"/>
+          </a:ln>
+        </p:spPr>
+        <p:style>
+          <a:lnRef idx="1">
+            <a:schemeClr val="accent1"/>
+          </a:lnRef>
+          <a:fillRef idx="0">
+            <a:schemeClr val="accent1"/>
+          </a:fillRef>
+          <a:effectRef idx="0">
+            <a:schemeClr val="accent1"/>
+          </a:effectRef>
+          <a:fontRef idx="minor">
+            <a:schemeClr val="tx1"/>
+          </a:fontRef>
+        </p:style>
+      </p:cxnSp>
     </p:spTree>
     <p:extLst>
       <p:ext uri="{BB962C8B-B14F-4D97-AF65-F5344CB8AC3E}">
@@ -20172,6 +20389,223 @@
           </a:p>
         </p:txBody>
       </p:sp>
+      <p:sp>
+        <p:nvSpPr>
+          <p:cNvPr id="4" name="TextBox 3">
+            <a:extLst>
+              <a:ext uri="{FF2B5EF4-FFF2-40B4-BE49-F238E27FC236}">
+                <a16:creationId xmlns:a16="http://schemas.microsoft.com/office/drawing/2014/main" id="{DAA47735-D812-7656-BBFC-0D118E2A73BD}"/>
+              </a:ext>
+            </a:extLst>
+          </p:cNvPr>
+          <p:cNvSpPr txBox="1"/>
+          <p:nvPr/>
+        </p:nvSpPr>
+        <p:spPr>
+          <a:xfrm>
+            <a:off x="5754123" y="4684065"/>
+            <a:ext cx="889397" cy="246221"/>
+          </a:xfrm>
+          <a:prstGeom prst="rect">
+            <a:avLst/>
+          </a:prstGeom>
+          <a:noFill/>
+        </p:spPr>
+        <p:txBody>
+          <a:bodyPr wrap="square">
+            <a:spAutoFit/>
+          </a:bodyPr>
+          <a:lstStyle/>
+          <a:p>
+            <a:r>
+              <a:rPr lang="fi-FI" sz="1000" dirty="0" err="1">
+                <a:solidFill>
+                  <a:schemeClr val="accent1">
+                    <a:lumMod val="75000"/>
+                  </a:schemeClr>
+                </a:solidFill>
+              </a:rPr>
+              <a:t>tokenSecret</a:t>
+            </a:r>
+            <a:endParaRPr lang="fi-FI" sz="1000" dirty="0"/>
+          </a:p>
+        </p:txBody>
+      </p:sp>
+      <p:sp>
+        <p:nvSpPr>
+          <p:cNvPr id="8" name="TextBox 7">
+            <a:extLst>
+              <a:ext uri="{FF2B5EF4-FFF2-40B4-BE49-F238E27FC236}">
+                <a16:creationId xmlns:a16="http://schemas.microsoft.com/office/drawing/2014/main" id="{9848206A-8FF4-6BD7-4A25-44A28A93F02E}"/>
+              </a:ext>
+            </a:extLst>
+          </p:cNvPr>
+          <p:cNvSpPr txBox="1"/>
+          <p:nvPr/>
+        </p:nvSpPr>
+        <p:spPr>
+          <a:xfrm>
+            <a:off x="6127244" y="4438528"/>
+            <a:ext cx="960095" cy="246221"/>
+          </a:xfrm>
+          <a:prstGeom prst="rect">
+            <a:avLst/>
+          </a:prstGeom>
+          <a:noFill/>
+        </p:spPr>
+        <p:txBody>
+          <a:bodyPr wrap="square">
+            <a:spAutoFit/>
+          </a:bodyPr>
+          <a:lstStyle/>
+          <a:p>
+            <a:r>
+              <a:rPr lang="fi-FI" sz="1000" dirty="0"/>
+              <a:t>-&gt; 2. </a:t>
+            </a:r>
+            <a:r>
+              <a:rPr lang="fi-FI" sz="1000" dirty="0" err="1"/>
+              <a:t>verify</a:t>
+            </a:r>
+            <a:endParaRPr lang="fi-FI" sz="1000" dirty="0"/>
+          </a:p>
+        </p:txBody>
+      </p:sp>
+      <p:sp>
+        <p:nvSpPr>
+          <p:cNvPr id="3" name="TextBox 2">
+            <a:extLst>
+              <a:ext uri="{FF2B5EF4-FFF2-40B4-BE49-F238E27FC236}">
+                <a16:creationId xmlns:a16="http://schemas.microsoft.com/office/drawing/2014/main" id="{0894A515-E235-0B99-B667-BCED88D086EC}"/>
+              </a:ext>
+            </a:extLst>
+          </p:cNvPr>
+          <p:cNvSpPr txBox="1"/>
+          <p:nvPr/>
+        </p:nvSpPr>
+        <p:spPr>
+          <a:xfrm>
+            <a:off x="5480290" y="4438527"/>
+            <a:ext cx="889397" cy="246221"/>
+          </a:xfrm>
+          <a:prstGeom prst="rect">
+            <a:avLst/>
+          </a:prstGeom>
+          <a:noFill/>
+        </p:spPr>
+        <p:txBody>
+          <a:bodyPr wrap="square">
+            <a:spAutoFit/>
+          </a:bodyPr>
+          <a:lstStyle/>
+          <a:p>
+            <a:r>
+              <a:rPr lang="fi-FI" sz="1000" dirty="0"/>
+              <a:t>&lt;- 1. </a:t>
+            </a:r>
+            <a:r>
+              <a:rPr lang="fi-FI" sz="1000" dirty="0" err="1"/>
+              <a:t>sign</a:t>
+            </a:r>
+            <a:r>
+              <a:rPr lang="fi-FI" sz="1000" dirty="0"/>
+              <a:t>, </a:t>
+            </a:r>
+          </a:p>
+        </p:txBody>
+      </p:sp>
+      <p:cxnSp>
+        <p:nvCxnSpPr>
+          <p:cNvPr id="6" name="Straight Arrow Connector 5">
+            <a:extLst>
+              <a:ext uri="{FF2B5EF4-FFF2-40B4-BE49-F238E27FC236}">
+                <a16:creationId xmlns:a16="http://schemas.microsoft.com/office/drawing/2014/main" id="{B593DD36-1745-56B8-4091-5B5B2C2790CE}"/>
+              </a:ext>
+            </a:extLst>
+          </p:cNvPr>
+          <p:cNvCxnSpPr>
+            <a:cxnSpLocks/>
+          </p:cNvCxnSpPr>
+          <p:nvPr/>
+        </p:nvCxnSpPr>
+        <p:spPr>
+          <a:xfrm flipH="1">
+            <a:off x="6321478" y="4643532"/>
+            <a:ext cx="123731" cy="97164"/>
+          </a:xfrm>
+          <a:prstGeom prst="straightConnector1">
+            <a:avLst/>
+          </a:prstGeom>
+          <a:ln>
+            <a:solidFill>
+              <a:schemeClr val="accent1"/>
+            </a:solidFill>
+            <a:prstDash val="sysDash"/>
+            <a:headEnd type="none"/>
+            <a:tailEnd type="none"/>
+          </a:ln>
+        </p:spPr>
+        <p:style>
+          <a:lnRef idx="1">
+            <a:schemeClr val="accent1"/>
+          </a:lnRef>
+          <a:fillRef idx="0">
+            <a:schemeClr val="accent1"/>
+          </a:fillRef>
+          <a:effectRef idx="0">
+            <a:schemeClr val="accent1"/>
+          </a:effectRef>
+          <a:fontRef idx="minor">
+            <a:schemeClr val="tx1"/>
+          </a:fontRef>
+        </p:style>
+      </p:cxnSp>
+      <p:cxnSp>
+        <p:nvCxnSpPr>
+          <p:cNvPr id="11" name="Straight Arrow Connector 10">
+            <a:extLst>
+              <a:ext uri="{FF2B5EF4-FFF2-40B4-BE49-F238E27FC236}">
+                <a16:creationId xmlns:a16="http://schemas.microsoft.com/office/drawing/2014/main" id="{E1FD5508-8DC4-6148-26A8-021709329DA0}"/>
+              </a:ext>
+            </a:extLst>
+          </p:cNvPr>
+          <p:cNvCxnSpPr>
+            <a:cxnSpLocks/>
+          </p:cNvCxnSpPr>
+          <p:nvPr/>
+        </p:nvCxnSpPr>
+        <p:spPr>
+          <a:xfrm>
+            <a:off x="5795617" y="4642528"/>
+            <a:ext cx="157203" cy="65834"/>
+          </a:xfrm>
+          <a:prstGeom prst="straightConnector1">
+            <a:avLst/>
+          </a:prstGeom>
+          <a:ln>
+            <a:solidFill>
+              <a:schemeClr val="accent1"/>
+            </a:solidFill>
+            <a:prstDash val="sysDash"/>
+            <a:headEnd type="none"/>
+            <a:tailEnd type="none"/>
+          </a:ln>
+        </p:spPr>
+        <p:style>
+          <a:lnRef idx="1">
+            <a:schemeClr val="accent1"/>
+          </a:lnRef>
+          <a:fillRef idx="0">
+            <a:schemeClr val="accent1"/>
+          </a:fillRef>
+          <a:effectRef idx="0">
+            <a:schemeClr val="accent1"/>
+          </a:effectRef>
+          <a:fontRef idx="minor">
+            <a:schemeClr val="tx1"/>
+          </a:fontRef>
+        </p:style>
+      </p:cxnSp>
     </p:spTree>
     <p:extLst>
       <p:ext uri="{BB962C8B-B14F-4D97-AF65-F5344CB8AC3E}">

</xml_diff>

<commit_message>
authorization instead of authentication
</commit_message>
<xml_diff>
--- a/WhatToDoInFrontBackAndDB_usability_performance_security/naturalpeople_webuserlogins_approles_dbusers_dbroles_owndbitems.pptx
+++ b/WhatToDoInFrontBackAndDB_usability_performance_security/naturalpeople_webuserlogins_approles_dbusers_dbroles_owndbitems.pptx
@@ -265,7 +265,7 @@
           <a:p>
             <a:fld id="{AB466767-0EC2-4146-A188-74EE8EB24694}" type="datetimeFigureOut">
               <a:rPr lang="fi-FI" smtClean="0"/>
-              <a:t>7.11.2024</a:t>
+              <a:t>4.3.2025</a:t>
             </a:fld>
             <a:endParaRPr lang="fi-FI"/>
           </a:p>
@@ -465,7 +465,7 @@
           <a:p>
             <a:fld id="{AB466767-0EC2-4146-A188-74EE8EB24694}" type="datetimeFigureOut">
               <a:rPr lang="fi-FI" smtClean="0"/>
-              <a:t>7.11.2024</a:t>
+              <a:t>4.3.2025</a:t>
             </a:fld>
             <a:endParaRPr lang="fi-FI"/>
           </a:p>
@@ -675,7 +675,7 @@
           <a:p>
             <a:fld id="{AB466767-0EC2-4146-A188-74EE8EB24694}" type="datetimeFigureOut">
               <a:rPr lang="fi-FI" smtClean="0"/>
-              <a:t>7.11.2024</a:t>
+              <a:t>4.3.2025</a:t>
             </a:fld>
             <a:endParaRPr lang="fi-FI"/>
           </a:p>
@@ -875,7 +875,7 @@
           <a:p>
             <a:fld id="{AB466767-0EC2-4146-A188-74EE8EB24694}" type="datetimeFigureOut">
               <a:rPr lang="fi-FI" smtClean="0"/>
-              <a:t>7.11.2024</a:t>
+              <a:t>4.3.2025</a:t>
             </a:fld>
             <a:endParaRPr lang="fi-FI"/>
           </a:p>
@@ -1151,7 +1151,7 @@
           <a:p>
             <a:fld id="{AB466767-0EC2-4146-A188-74EE8EB24694}" type="datetimeFigureOut">
               <a:rPr lang="fi-FI" smtClean="0"/>
-              <a:t>7.11.2024</a:t>
+              <a:t>4.3.2025</a:t>
             </a:fld>
             <a:endParaRPr lang="fi-FI"/>
           </a:p>
@@ -1419,7 +1419,7 @@
           <a:p>
             <a:fld id="{AB466767-0EC2-4146-A188-74EE8EB24694}" type="datetimeFigureOut">
               <a:rPr lang="fi-FI" smtClean="0"/>
-              <a:t>7.11.2024</a:t>
+              <a:t>4.3.2025</a:t>
             </a:fld>
             <a:endParaRPr lang="fi-FI"/>
           </a:p>
@@ -1834,7 +1834,7 @@
           <a:p>
             <a:fld id="{AB466767-0EC2-4146-A188-74EE8EB24694}" type="datetimeFigureOut">
               <a:rPr lang="fi-FI" smtClean="0"/>
-              <a:t>7.11.2024</a:t>
+              <a:t>4.3.2025</a:t>
             </a:fld>
             <a:endParaRPr lang="fi-FI"/>
           </a:p>
@@ -1976,7 +1976,7 @@
           <a:p>
             <a:fld id="{AB466767-0EC2-4146-A188-74EE8EB24694}" type="datetimeFigureOut">
               <a:rPr lang="fi-FI" smtClean="0"/>
-              <a:t>7.11.2024</a:t>
+              <a:t>4.3.2025</a:t>
             </a:fld>
             <a:endParaRPr lang="fi-FI"/>
           </a:p>
@@ -2089,7 +2089,7 @@
           <a:p>
             <a:fld id="{AB466767-0EC2-4146-A188-74EE8EB24694}" type="datetimeFigureOut">
               <a:rPr lang="fi-FI" smtClean="0"/>
-              <a:t>7.11.2024</a:t>
+              <a:t>4.3.2025</a:t>
             </a:fld>
             <a:endParaRPr lang="fi-FI"/>
           </a:p>
@@ -2402,7 +2402,7 @@
           <a:p>
             <a:fld id="{AB466767-0EC2-4146-A188-74EE8EB24694}" type="datetimeFigureOut">
               <a:rPr lang="fi-FI" smtClean="0"/>
-              <a:t>7.11.2024</a:t>
+              <a:t>4.3.2025</a:t>
             </a:fld>
             <a:endParaRPr lang="fi-FI"/>
           </a:p>
@@ -2691,7 +2691,7 @@
           <a:p>
             <a:fld id="{AB466767-0EC2-4146-A188-74EE8EB24694}" type="datetimeFigureOut">
               <a:rPr lang="fi-FI" smtClean="0"/>
-              <a:t>7.11.2024</a:t>
+              <a:t>4.3.2025</a:t>
             </a:fld>
             <a:endParaRPr lang="fi-FI"/>
           </a:p>
@@ -2934,7 +2934,7 @@
           <a:p>
             <a:fld id="{AB466767-0EC2-4146-A188-74EE8EB24694}" type="datetimeFigureOut">
               <a:rPr lang="fi-FI" smtClean="0"/>
-              <a:t>7.11.2024</a:t>
+              <a:t>4.3.2025</a:t>
             </a:fld>
             <a:endParaRPr lang="fi-FI"/>
           </a:p>
@@ -5294,7 +5294,7 @@
             <a:avLst/>
           </a:prstGeom>
           <a:ln>
-            <a:headEnd type="triangle"/>
+            <a:headEnd type="none"/>
             <a:tailEnd type="triangle"/>
           </a:ln>
         </p:spPr>
@@ -10803,7 +10803,7 @@
             <a:avLst/>
           </a:prstGeom>
           <a:ln>
-            <a:headEnd type="triangle"/>
+            <a:headEnd type="none"/>
             <a:tailEnd type="triangle"/>
           </a:ln>
         </p:spPr>
@@ -11726,7 +11726,7 @@
                   </a:schemeClr>
                 </a:solidFill>
               </a:rPr>
-              <a:t>authentication</a:t>
+              <a:t>auth</a:t>
             </a:r>
             <a:r>
               <a:rPr lang="fi-FI" sz="900" dirty="0">
@@ -11736,6 +11736,26 @@
                   </a:schemeClr>
                 </a:solidFill>
               </a:rPr>
+              <a:t>/</a:t>
+            </a:r>
+            <a:r>
+              <a:rPr lang="fi-FI" sz="900" dirty="0" err="1">
+                <a:solidFill>
+                  <a:schemeClr val="accent1">
+                    <a:lumMod val="75000"/>
+                  </a:schemeClr>
+                </a:solidFill>
+              </a:rPr>
+              <a:t>authorization</a:t>
+            </a:r>
+            <a:r>
+              <a:rPr lang="fi-FI" sz="900" dirty="0">
+                <a:solidFill>
+                  <a:schemeClr val="accent1">
+                    <a:lumMod val="75000"/>
+                  </a:schemeClr>
+                </a:solidFill>
+              </a:rPr>
               <a:t> </a:t>
             </a:r>
             <a:r>
@@ -11756,27 +11776,7 @@
                   </a:schemeClr>
                 </a:solidFill>
               </a:rPr>
-              <a:t> (</a:t>
-            </a:r>
-            <a:r>
-              <a:rPr lang="fi-FI" sz="900" dirty="0" err="1">
-                <a:solidFill>
-                  <a:schemeClr val="accent1">
-                    <a:lumMod val="75000"/>
-                  </a:schemeClr>
-                </a:solidFill>
-              </a:rPr>
-              <a:t>e.g</a:t>
-            </a:r>
-            <a:r>
-              <a:rPr lang="fi-FI" sz="900" dirty="0">
-                <a:solidFill>
-                  <a:schemeClr val="accent1">
-                    <a:lumMod val="75000"/>
-                  </a:schemeClr>
-                </a:solidFill>
-              </a:rPr>
-              <a:t>. w. JWT), </a:t>
+              <a:t> (e.g. w. JWT), </a:t>
             </a:r>
             <a:r>
               <a:rPr lang="fi-FI" sz="900" dirty="0" err="1">
@@ -16525,7 +16525,7 @@
             <a:avLst/>
           </a:prstGeom>
           <a:ln>
-            <a:headEnd type="triangle"/>
+            <a:headEnd type="none"/>
             <a:tailEnd type="triangle"/>
           </a:ln>
         </p:spPr>
@@ -20157,7 +20157,7 @@
                   </a:schemeClr>
                 </a:solidFill>
               </a:rPr>
-              <a:t>authentication</a:t>
+              <a:t>authorization</a:t>
             </a:r>
             <a:r>
               <a:rPr lang="fi-FI" sz="900" dirty="0">
@@ -20187,27 +20187,7 @@
                   </a:schemeClr>
                 </a:solidFill>
               </a:rPr>
-              <a:t> (</a:t>
-            </a:r>
-            <a:r>
-              <a:rPr lang="fi-FI" sz="900" dirty="0" err="1">
-                <a:solidFill>
-                  <a:schemeClr val="accent1">
-                    <a:lumMod val="75000"/>
-                  </a:schemeClr>
-                </a:solidFill>
-              </a:rPr>
-              <a:t>e.g</a:t>
-            </a:r>
-            <a:r>
-              <a:rPr lang="fi-FI" sz="900" dirty="0">
-                <a:solidFill>
-                  <a:schemeClr val="accent1">
-                    <a:lumMod val="75000"/>
-                  </a:schemeClr>
-                </a:solidFill>
-              </a:rPr>
-              <a:t>. w. JWT), </a:t>
+              <a:t> (e.g. w. JWT), </a:t>
             </a:r>
             <a:r>
               <a:rPr lang="fi-FI" sz="900" dirty="0" err="1">

</xml_diff>